<commit_message>
Change readnme to explanation, add YLL script and sections
</commit_message>
<xml_diff>
--- a/DHSC_powerpoint_example.pptx
+++ b/DHSC_powerpoint_example.pptx
@@ -7243,7 +7243,7 @@
             </a:pPr>
             <a:r>
               <a:rPr/>
-              <a:t>Published 12/11/2024</a:t>
+              <a:t>Published 18/11/2024</a:t>
             </a:r>
           </a:p>
         </p:txBody>
@@ -8450,30 +8450,24 @@
           <a:bodyPr/>
           <a:lstStyle/>
           <a:p>
-            <a:pPr lvl="0" indent="0" marL="0">
-              <a:buNone/>
-            </a:pPr>
+            <a:pPr lvl="0"/>
             <a:r>
               <a:rPr/>
               <a:t>Some of these will be classified as related to drug misuse where an ICD-10 code indicates mental and behavioural disorders due to drug use (excluding alcohol and tobacco) without a specific substance (e.g. F19 “multiple drug use and use of other psychoactive substances”).</a:t>
             </a:r>
           </a:p>
           <a:p>
-            <a:pPr lvl="0" indent="0" marL="0">
-              <a:buNone/>
-            </a:pPr>
+            <a:pPr lvl="0"/>
             <a:r>
               <a:rPr/>
-              <a:t>But others, broadly those coded as accidental/intentional self-poisonings or self-poisonings of unknown intent, will not be classfified as related to drug misuse unless a controlled drug under Misuse of Drugs Act 1971 was mentioned on the death record.</a:t>
-            </a:r>
-          </a:p>
-          <a:p>
-            <a:pPr lvl="0" indent="0" marL="0">
-              <a:buNone/>
-            </a:pPr>
+              <a:t>Others, coded as accidental/intentional self-poisonings or self-poisonings of unknown intent, will not be classfified as related to drug misuse unless a controlled drug under Misuse of Drugs Act 1971 was mentioned on the death record.</a:t>
+            </a:r>
+          </a:p>
+          <a:p>
+            <a:pPr lvl="0"/>
             <a:r>
               <a:rPr/>
-              <a:t>The data linkage between ONS mortality and NDTMS allows some of those deaths to be identified indirectly as related to drug misuse where the person that died had had contact with the drug treatment system within a year of their date of death.</a:t>
+              <a:t>The data linkage between ONS mortality and NDTMS allows some of those deaths to be identified indirectly as related to drug misuse where the person that died had had contact with the drug treatment.</a:t>
             </a:r>
           </a:p>
         </p:txBody>
@@ -8545,7 +8539,7 @@
       </p:grpSpPr>
       <p:pic>
         <p:nvPicPr>
-          <p:cNvPr descr="ppt_output_files/figure-pptx/unnamed-chunk-1-1.png" id="0" name="Picture 1"/>
+          <p:cNvPr descr="plots/plot_1.png" id="0" name="Picture 1"/>
           <p:cNvPicPr>
             <a:picLocks noGrp="1" noChangeAspect="1"/>
           </p:cNvPicPr>
@@ -8559,8 +8553,8 @@
         </p:blipFill>
         <p:spPr bwMode="auto">
           <a:xfrm>
-            <a:off x="1295400" y="1079500"/>
-            <a:ext cx="6502400" cy="3251200"/>
+            <a:off x="2209800" y="1079500"/>
+            <a:ext cx="4699000" cy="3251200"/>
           </a:xfrm>
           <a:prstGeom prst="rect">
             <a:avLst/>
@@ -8735,7 +8729,7 @@
       </p:grpSpPr>
       <p:graphicFrame xmlns:a="http://schemas.openxmlformats.org/drawingml/2006/main" xmlns:r="http://schemas.openxmlformats.org/officeDocument/2006/relationships" xmlns:p="http://schemas.openxmlformats.org/presentationml/2006/main">
         <p:nvGraphicFramePr>
-          <p:cNvPr id="730808067" name=""/>
+          <p:cNvPr id="886570921" name=""/>
           <p:cNvGraphicFramePr>
             <a:graphicFrameLocks noGrp="true"/>
           </p:cNvGraphicFramePr>

</xml_diff>